<commit_message>
updated link on ppt
</commit_message>
<xml_diff>
--- a/powerpoint.pptx
+++ b/powerpoint.pptx
@@ -28162,7 +28162,7 @@
               <a:buNone/>
             </a:pPr>
             <a:r>
-              <a:rPr lang="en-US" b="1" i="0" u="sng">
+              <a:rPr lang="en-US" b="1" i="0" u="sng" dirty="0">
                 <a:solidFill>
                   <a:schemeClr val="tx1"/>
                 </a:solidFill>
@@ -28172,9 +28172,23 @@
                 </a:highlight>
                 <a:hlinkClick r:id="rId2"/>
               </a:rPr>
-              <a:t>https://ddaniel2024.github.io/Project-3/</a:t>
+              <a:t>https://ddaniel2024.github.io/Project-3/global</a:t>
             </a:r>
-            <a:endParaRPr lang="en-US">
+            <a:endParaRPr lang="en-US" b="1" i="0" u="sng" dirty="0">
+              <a:solidFill>
+                <a:schemeClr val="tx1"/>
+              </a:solidFill>
+              <a:effectLst/>
+              <a:highlight>
+                <a:srgbClr val="FFFFFF"/>
+              </a:highlight>
+            </a:endParaRPr>
+          </a:p>
+          <a:p>
+            <a:pPr marL="0" indent="0" algn="r">
+              <a:buNone/>
+            </a:pPr>
+            <a:endParaRPr lang="en-US" dirty="0">
               <a:solidFill>
                 <a:schemeClr val="tx1"/>
               </a:solidFill>

</xml_diff>